<commit_message>
docs: [U888-51] added animal photo upload button
</commit_message>
<xml_diff>
--- a/wireframing/Wireframes_v2.pptx
+++ b/wireframing/Wireframes_v2.pptx
@@ -3567,12 +3567,47 @@
           </a:p>
         </p:txBody>
       </p:sp>
+      <p:sp>
+        <p:nvSpPr>
+          <p:cNvPr id="8" name="TextBox 7">
+            <a:extLst>
+              <a:ext uri="{FF2B5EF4-FFF2-40B4-BE49-F238E27FC236}">
+                <a16:creationId xmlns:a16="http://schemas.microsoft.com/office/drawing/2014/main" id="{DF6CD0EC-A196-4028-BA2A-AF1C8E76326E}"/>
+              </a:ext>
+            </a:extLst>
+          </p:cNvPr>
+          <p:cNvSpPr txBox="1"/>
+          <p:nvPr/>
+        </p:nvSpPr>
+        <p:spPr>
+          <a:xfrm>
+            <a:off x="838199" y="2590887"/>
+            <a:ext cx="2808552" cy="646331"/>
+          </a:xfrm>
+          <a:prstGeom prst="rect">
+            <a:avLst/>
+          </a:prstGeom>
+          <a:noFill/>
+        </p:spPr>
+        <p:txBody>
+          <a:bodyPr wrap="square" rtlCol="0">
+            <a:spAutoFit/>
+          </a:bodyPr>
+          <a:lstStyle/>
+          <a:p>
+            <a:r>
+              <a:rPr lang="en-US" dirty="0"/>
+              <a:t>Students don’t have access to change status button</a:t>
+            </a:r>
+          </a:p>
+        </p:txBody>
+      </p:sp>
       <p:pic>
         <p:nvPicPr>
-          <p:cNvPr id="7" name="Content Placeholder 6" descr="Diagram&#10;&#10;Description automatically generated">
-            <a:extLst>
-              <a:ext uri="{FF2B5EF4-FFF2-40B4-BE49-F238E27FC236}">
-                <a16:creationId xmlns:a16="http://schemas.microsoft.com/office/drawing/2014/main" id="{1F946BEB-EBBB-4050-A06D-3BBE523CE4ED}"/>
+          <p:cNvPr id="6" name="Content Placeholder 5" descr="Diagram&#10;&#10;Description automatically generated">
+            <a:extLst>
+              <a:ext uri="{FF2B5EF4-FFF2-40B4-BE49-F238E27FC236}">
+                <a16:creationId xmlns:a16="http://schemas.microsoft.com/office/drawing/2014/main" id="{270393C5-B3BC-4522-BE6F-DE0C775AC00F}"/>
               </a:ext>
             </a:extLst>
           </p:cNvPr>
@@ -3602,41 +3637,6 @@
           </a:xfrm>
         </p:spPr>
       </p:pic>
-      <p:sp>
-        <p:nvSpPr>
-          <p:cNvPr id="8" name="TextBox 7">
-            <a:extLst>
-              <a:ext uri="{FF2B5EF4-FFF2-40B4-BE49-F238E27FC236}">
-                <a16:creationId xmlns:a16="http://schemas.microsoft.com/office/drawing/2014/main" id="{DF6CD0EC-A196-4028-BA2A-AF1C8E76326E}"/>
-              </a:ext>
-            </a:extLst>
-          </p:cNvPr>
-          <p:cNvSpPr txBox="1"/>
-          <p:nvPr/>
-        </p:nvSpPr>
-        <p:spPr>
-          <a:xfrm>
-            <a:off x="838199" y="2590887"/>
-            <a:ext cx="2808552" cy="646331"/>
-          </a:xfrm>
-          <a:prstGeom prst="rect">
-            <a:avLst/>
-          </a:prstGeom>
-          <a:noFill/>
-        </p:spPr>
-        <p:txBody>
-          <a:bodyPr wrap="square" rtlCol="0">
-            <a:spAutoFit/>
-          </a:bodyPr>
-          <a:lstStyle/>
-          <a:p>
-            <a:r>
-              <a:rPr lang="en-US" dirty="0"/>
-              <a:t>Students don’t have access to change status button</a:t>
-            </a:r>
-          </a:p>
-        </p:txBody>
-      </p:sp>
     </p:spTree>
     <p:extLst>
       <p:ext uri="{BB962C8B-B14F-4D97-AF65-F5344CB8AC3E}">

</xml_diff>

<commit_message>
docs: [U888-56] reflecting changes in ppt
</commit_message>
<xml_diff>
--- a/wireframing/Wireframes_v2.pptx
+++ b/wireframing/Wireframes_v2.pptx
@@ -274,7 +274,7 @@
           <a:p>
             <a:fld id="{552FEBA7-0CC5-404C-A4C7-482FE5E6CA26}" type="datetimeFigureOut">
               <a:rPr lang="en-CA" smtClean="0"/>
-              <a:t>21-Oct-2021</a:t>
+              <a:t>22-Oct-2021</a:t>
             </a:fld>
             <a:endParaRPr lang="en-CA"/>
           </a:p>
@@ -474,7 +474,7 @@
           <a:p>
             <a:fld id="{552FEBA7-0CC5-404C-A4C7-482FE5E6CA26}" type="datetimeFigureOut">
               <a:rPr lang="en-CA" smtClean="0"/>
-              <a:t>21-Oct-2021</a:t>
+              <a:t>22-Oct-2021</a:t>
             </a:fld>
             <a:endParaRPr lang="en-CA"/>
           </a:p>
@@ -684,7 +684,7 @@
           <a:p>
             <a:fld id="{552FEBA7-0CC5-404C-A4C7-482FE5E6CA26}" type="datetimeFigureOut">
               <a:rPr lang="en-CA" smtClean="0"/>
-              <a:t>21-Oct-2021</a:t>
+              <a:t>22-Oct-2021</a:t>
             </a:fld>
             <a:endParaRPr lang="en-CA"/>
           </a:p>
@@ -884,7 +884,7 @@
           <a:p>
             <a:fld id="{552FEBA7-0CC5-404C-A4C7-482FE5E6CA26}" type="datetimeFigureOut">
               <a:rPr lang="en-CA" smtClean="0"/>
-              <a:t>21-Oct-2021</a:t>
+              <a:t>22-Oct-2021</a:t>
             </a:fld>
             <a:endParaRPr lang="en-CA"/>
           </a:p>
@@ -1160,7 +1160,7 @@
           <a:p>
             <a:fld id="{552FEBA7-0CC5-404C-A4C7-482FE5E6CA26}" type="datetimeFigureOut">
               <a:rPr lang="en-CA" smtClean="0"/>
-              <a:t>21-Oct-2021</a:t>
+              <a:t>22-Oct-2021</a:t>
             </a:fld>
             <a:endParaRPr lang="en-CA"/>
           </a:p>
@@ -1428,7 +1428,7 @@
           <a:p>
             <a:fld id="{552FEBA7-0CC5-404C-A4C7-482FE5E6CA26}" type="datetimeFigureOut">
               <a:rPr lang="en-CA" smtClean="0"/>
-              <a:t>21-Oct-2021</a:t>
+              <a:t>22-Oct-2021</a:t>
             </a:fld>
             <a:endParaRPr lang="en-CA"/>
           </a:p>
@@ -1843,7 +1843,7 @@
           <a:p>
             <a:fld id="{552FEBA7-0CC5-404C-A4C7-482FE5E6CA26}" type="datetimeFigureOut">
               <a:rPr lang="en-CA" smtClean="0"/>
-              <a:t>21-Oct-2021</a:t>
+              <a:t>22-Oct-2021</a:t>
             </a:fld>
             <a:endParaRPr lang="en-CA"/>
           </a:p>
@@ -1985,7 +1985,7 @@
           <a:p>
             <a:fld id="{552FEBA7-0CC5-404C-A4C7-482FE5E6CA26}" type="datetimeFigureOut">
               <a:rPr lang="en-CA" smtClean="0"/>
-              <a:t>21-Oct-2021</a:t>
+              <a:t>22-Oct-2021</a:t>
             </a:fld>
             <a:endParaRPr lang="en-CA"/>
           </a:p>
@@ -2098,7 +2098,7 @@
           <a:p>
             <a:fld id="{552FEBA7-0CC5-404C-A4C7-482FE5E6CA26}" type="datetimeFigureOut">
               <a:rPr lang="en-CA" smtClean="0"/>
-              <a:t>21-Oct-2021</a:t>
+              <a:t>22-Oct-2021</a:t>
             </a:fld>
             <a:endParaRPr lang="en-CA"/>
           </a:p>
@@ -2411,7 +2411,7 @@
           <a:p>
             <a:fld id="{552FEBA7-0CC5-404C-A4C7-482FE5E6CA26}" type="datetimeFigureOut">
               <a:rPr lang="en-CA" smtClean="0"/>
-              <a:t>21-Oct-2021</a:t>
+              <a:t>22-Oct-2021</a:t>
             </a:fld>
             <a:endParaRPr lang="en-CA"/>
           </a:p>
@@ -2700,7 +2700,7 @@
           <a:p>
             <a:fld id="{552FEBA7-0CC5-404C-A4C7-482FE5E6CA26}" type="datetimeFigureOut">
               <a:rPr lang="en-CA" smtClean="0"/>
-              <a:t>21-Oct-2021</a:t>
+              <a:t>22-Oct-2021</a:t>
             </a:fld>
             <a:endParaRPr lang="en-CA"/>
           </a:p>
@@ -2943,7 +2943,7 @@
           <a:p>
             <a:fld id="{552FEBA7-0CC5-404C-A4C7-482FE5E6CA26}" type="datetimeFigureOut">
               <a:rPr lang="en-CA" smtClean="0"/>
-              <a:t>21-Oct-2021</a:t>
+              <a:t>22-Oct-2021</a:t>
             </a:fld>
             <a:endParaRPr lang="en-CA"/>
           </a:p>
@@ -3476,10 +3476,10 @@
       </p:sp>
       <p:pic>
         <p:nvPicPr>
-          <p:cNvPr id="5" name="Content Placeholder 4" descr="Diagram&#10;&#10;Description automatically generated with medium confidence">
-            <a:extLst>
-              <a:ext uri="{FF2B5EF4-FFF2-40B4-BE49-F238E27FC236}">
-                <a16:creationId xmlns:a16="http://schemas.microsoft.com/office/drawing/2014/main" id="{57924E03-1721-4926-8BD5-85EC57E4DE3F}"/>
+          <p:cNvPr id="8" name="Content Placeholder 7" descr="Graphical user interface&#10;&#10;Description automatically generated">
+            <a:extLst>
+              <a:ext uri="{FF2B5EF4-FFF2-40B4-BE49-F238E27FC236}">
+                <a16:creationId xmlns:a16="http://schemas.microsoft.com/office/drawing/2014/main" id="{C8C68F16-EE0A-425F-B6DB-7B3257DE72AA}"/>
               </a:ext>
             </a:extLst>
           </p:cNvPr>
@@ -3504,11 +3504,46 @@
         </p:blipFill>
         <p:spPr>
           <a:xfrm>
-            <a:off x="2167468" y="1690688"/>
-            <a:ext cx="9186332" cy="5167312"/>
+            <a:off x="7098384" y="1027906"/>
+            <a:ext cx="4255416" cy="5469082"/>
           </a:xfrm>
         </p:spPr>
       </p:pic>
+      <p:sp>
+        <p:nvSpPr>
+          <p:cNvPr id="6" name="TextBox 5">
+            <a:extLst>
+              <a:ext uri="{FF2B5EF4-FFF2-40B4-BE49-F238E27FC236}">
+                <a16:creationId xmlns:a16="http://schemas.microsoft.com/office/drawing/2014/main" id="{1F5466F6-2C22-4836-90DC-F129575F8937}"/>
+              </a:ext>
+            </a:extLst>
+          </p:cNvPr>
+          <p:cNvSpPr txBox="1"/>
+          <p:nvPr/>
+        </p:nvSpPr>
+        <p:spPr>
+          <a:xfrm>
+            <a:off x="838199" y="2590887"/>
+            <a:ext cx="2808552" cy="646331"/>
+          </a:xfrm>
+          <a:prstGeom prst="rect">
+            <a:avLst/>
+          </a:prstGeom>
+          <a:noFill/>
+        </p:spPr>
+        <p:txBody>
+          <a:bodyPr wrap="square" rtlCol="0">
+            <a:spAutoFit/>
+          </a:bodyPr>
+          <a:lstStyle/>
+          <a:p>
+            <a:r>
+              <a:rPr lang="en-US" dirty="0"/>
+              <a:t>Click the search results to see animal’s profile</a:t>
+            </a:r>
+          </a:p>
+        </p:txBody>
+      </p:sp>
     </p:spTree>
     <p:extLst>
       <p:ext uri="{BB962C8B-B14F-4D97-AF65-F5344CB8AC3E}">
@@ -3597,7 +3632,7 @@
           <a:p>
             <a:r>
               <a:rPr lang="en-US" dirty="0"/>
-              <a:t>Students don’t have access to change status button</a:t>
+              <a:t>Students don’t have access to modify any details</a:t>
             </a:r>
           </a:p>
         </p:txBody>
@@ -4123,10 +4158,10 @@
       </p:sp>
       <p:pic>
         <p:nvPicPr>
-          <p:cNvPr id="7" name="Content Placeholder 6" descr="Diagram&#10;&#10;Description automatically generated">
-            <a:extLst>
-              <a:ext uri="{FF2B5EF4-FFF2-40B4-BE49-F238E27FC236}">
-                <a16:creationId xmlns:a16="http://schemas.microsoft.com/office/drawing/2014/main" id="{7CED3197-6E3F-403C-B42B-8AD06FE43308}"/>
+          <p:cNvPr id="15" name="Content Placeholder 14" descr="A picture containing diagram&#10;&#10;Description automatically generated">
+            <a:extLst>
+              <a:ext uri="{FF2B5EF4-FFF2-40B4-BE49-F238E27FC236}">
+                <a16:creationId xmlns:a16="http://schemas.microsoft.com/office/drawing/2014/main" id="{7244A750-2412-4D56-9AF5-7CFA45286DF4}"/>
               </a:ext>
             </a:extLst>
           </p:cNvPr>
@@ -4151,8 +4186,8 @@
         </p:blipFill>
         <p:spPr>
           <a:xfrm>
-            <a:off x="51455" y="48034"/>
-            <a:ext cx="12080841" cy="6725126"/>
+            <a:off x="103695" y="94267"/>
+            <a:ext cx="11990896" cy="6674177"/>
           </a:xfrm>
         </p:spPr>
       </p:pic>
@@ -4821,10 +4856,10 @@
       </p:sp>
       <p:pic>
         <p:nvPicPr>
-          <p:cNvPr id="5" name="Content Placeholder 4" descr="Diagram&#10;&#10;Description automatically generated">
-            <a:extLst>
-              <a:ext uri="{FF2B5EF4-FFF2-40B4-BE49-F238E27FC236}">
-                <a16:creationId xmlns:a16="http://schemas.microsoft.com/office/drawing/2014/main" id="{C03BF4ED-D315-4251-9F68-422921EE271A}"/>
+          <p:cNvPr id="7" name="Content Placeholder 6" descr="Graphical user interface&#10;&#10;Description automatically generated">
+            <a:extLst>
+              <a:ext uri="{FF2B5EF4-FFF2-40B4-BE49-F238E27FC236}">
+                <a16:creationId xmlns:a16="http://schemas.microsoft.com/office/drawing/2014/main" id="{DA25809F-3883-4C82-84CF-D8E14B67274E}"/>
               </a:ext>
             </a:extLst>
           </p:cNvPr>
@@ -4849,11 +4884,46 @@
         </p:blipFill>
         <p:spPr>
           <a:xfrm>
-            <a:off x="2167467" y="1690688"/>
-            <a:ext cx="9186333" cy="5167312"/>
+            <a:off x="7059299" y="1027906"/>
+            <a:ext cx="4294501" cy="5464969"/>
           </a:xfrm>
         </p:spPr>
       </p:pic>
+      <p:sp>
+        <p:nvSpPr>
+          <p:cNvPr id="8" name="TextBox 7">
+            <a:extLst>
+              <a:ext uri="{FF2B5EF4-FFF2-40B4-BE49-F238E27FC236}">
+                <a16:creationId xmlns:a16="http://schemas.microsoft.com/office/drawing/2014/main" id="{D7303C7E-D3D0-412D-B34B-922232F058C3}"/>
+              </a:ext>
+            </a:extLst>
+          </p:cNvPr>
+          <p:cNvSpPr txBox="1"/>
+          <p:nvPr/>
+        </p:nvSpPr>
+        <p:spPr>
+          <a:xfrm>
+            <a:off x="838199" y="2590887"/>
+            <a:ext cx="2808552" cy="646331"/>
+          </a:xfrm>
+          <a:prstGeom prst="rect">
+            <a:avLst/>
+          </a:prstGeom>
+          <a:noFill/>
+        </p:spPr>
+        <p:txBody>
+          <a:bodyPr wrap="square" rtlCol="0">
+            <a:spAutoFit/>
+          </a:bodyPr>
+          <a:lstStyle/>
+          <a:p>
+            <a:r>
+              <a:rPr lang="en-US" dirty="0"/>
+              <a:t>Click the search results to see user’s details</a:t>
+            </a:r>
+          </a:p>
+        </p:txBody>
+      </p:sp>
     </p:spTree>
     <p:extLst>
       <p:ext uri="{BB962C8B-B14F-4D97-AF65-F5344CB8AC3E}">
@@ -4914,10 +4984,10 @@
       </p:sp>
       <p:pic>
         <p:nvPicPr>
-          <p:cNvPr id="5" name="Content Placeholder 4" descr="Graphical user interface&#10;&#10;Description automatically generated">
-            <a:extLst>
-              <a:ext uri="{FF2B5EF4-FFF2-40B4-BE49-F238E27FC236}">
-                <a16:creationId xmlns:a16="http://schemas.microsoft.com/office/drawing/2014/main" id="{1D4671A6-7BBC-4385-96B9-3D1C22A194EB}"/>
+          <p:cNvPr id="7" name="Content Placeholder 6" descr="Graphical user interface&#10;&#10;Description automatically generated">
+            <a:extLst>
+              <a:ext uri="{FF2B5EF4-FFF2-40B4-BE49-F238E27FC236}">
+                <a16:creationId xmlns:a16="http://schemas.microsoft.com/office/drawing/2014/main" id="{1FD59847-0709-459B-8040-443792873139}"/>
               </a:ext>
             </a:extLst>
           </p:cNvPr>
@@ -4942,11 +5012,46 @@
         </p:blipFill>
         <p:spPr>
           <a:xfrm>
-            <a:off x="2167468" y="1690688"/>
-            <a:ext cx="9186332" cy="5167312"/>
+            <a:off x="7333347" y="1027906"/>
+            <a:ext cx="4020453" cy="5167106"/>
           </a:xfrm>
         </p:spPr>
       </p:pic>
+      <p:sp>
+        <p:nvSpPr>
+          <p:cNvPr id="8" name="TextBox 7">
+            <a:extLst>
+              <a:ext uri="{FF2B5EF4-FFF2-40B4-BE49-F238E27FC236}">
+                <a16:creationId xmlns:a16="http://schemas.microsoft.com/office/drawing/2014/main" id="{FA626003-0F05-444B-ABE7-73D4255F3558}"/>
+              </a:ext>
+            </a:extLst>
+          </p:cNvPr>
+          <p:cNvSpPr txBox="1"/>
+          <p:nvPr/>
+        </p:nvSpPr>
+        <p:spPr>
+          <a:xfrm>
+            <a:off x="838199" y="2590887"/>
+            <a:ext cx="2808552" cy="646331"/>
+          </a:xfrm>
+          <a:prstGeom prst="rect">
+            <a:avLst/>
+          </a:prstGeom>
+          <a:noFill/>
+        </p:spPr>
+        <p:txBody>
+          <a:bodyPr wrap="square" rtlCol="0">
+            <a:spAutoFit/>
+          </a:bodyPr>
+          <a:lstStyle/>
+          <a:p>
+            <a:r>
+              <a:rPr lang="en-US" dirty="0"/>
+              <a:t>Only admin may be able to modify details</a:t>
+            </a:r>
+          </a:p>
+        </p:txBody>
+      </p:sp>
     </p:spTree>
     <p:extLst>
       <p:ext uri="{BB962C8B-B14F-4D97-AF65-F5344CB8AC3E}">

</xml_diff>